<commit_message>
Adicionado exercicio xml json
</commit_message>
<xml_diff>
--- a/PPT/pt/PPT3_-_JSON_XML_e_APIs.pptx
+++ b/PPT/pt/PPT3_-_JSON_XML_e_APIs.pptx
@@ -247,7 +247,7 @@
           <a:p>
             <a:fld id="{A8056B92-FCDB-4810-8779-64E0CAC2F787}" type="datetimeFigureOut">
               <a:rPr lang="pt-PT" smtClean="0"/>
-              <a:t>20/05/2018</a:t>
+              <a:t>23/05/2018</a:t>
             </a:fld>
             <a:endParaRPr lang="pt-PT"/>
           </a:p>
@@ -417,7 +417,7 @@
           <a:p>
             <a:fld id="{A8056B92-FCDB-4810-8779-64E0CAC2F787}" type="datetimeFigureOut">
               <a:rPr lang="pt-PT" smtClean="0"/>
-              <a:t>20/05/2018</a:t>
+              <a:t>23/05/2018</a:t>
             </a:fld>
             <a:endParaRPr lang="pt-PT"/>
           </a:p>
@@ -597,7 +597,7 @@
           <a:p>
             <a:fld id="{A8056B92-FCDB-4810-8779-64E0CAC2F787}" type="datetimeFigureOut">
               <a:rPr lang="pt-PT" smtClean="0"/>
-              <a:t>20/05/2018</a:t>
+              <a:t>23/05/2018</a:t>
             </a:fld>
             <a:endParaRPr lang="pt-PT"/>
           </a:p>
@@ -767,7 +767,7 @@
           <a:p>
             <a:fld id="{A8056B92-FCDB-4810-8779-64E0CAC2F787}" type="datetimeFigureOut">
               <a:rPr lang="pt-PT" smtClean="0"/>
-              <a:t>20/05/2018</a:t>
+              <a:t>23/05/2018</a:t>
             </a:fld>
             <a:endParaRPr lang="pt-PT"/>
           </a:p>
@@ -1013,7 +1013,7 @@
           <a:p>
             <a:fld id="{A8056B92-FCDB-4810-8779-64E0CAC2F787}" type="datetimeFigureOut">
               <a:rPr lang="pt-PT" smtClean="0"/>
-              <a:t>20/05/2018</a:t>
+              <a:t>23/05/2018</a:t>
             </a:fld>
             <a:endParaRPr lang="pt-PT"/>
           </a:p>
@@ -1245,7 +1245,7 @@
           <a:p>
             <a:fld id="{A8056B92-FCDB-4810-8779-64E0CAC2F787}" type="datetimeFigureOut">
               <a:rPr lang="pt-PT" smtClean="0"/>
-              <a:t>20/05/2018</a:t>
+              <a:t>23/05/2018</a:t>
             </a:fld>
             <a:endParaRPr lang="pt-PT"/>
           </a:p>
@@ -1612,7 +1612,7 @@
           <a:p>
             <a:fld id="{A8056B92-FCDB-4810-8779-64E0CAC2F787}" type="datetimeFigureOut">
               <a:rPr lang="pt-PT" smtClean="0"/>
-              <a:t>20/05/2018</a:t>
+              <a:t>23/05/2018</a:t>
             </a:fld>
             <a:endParaRPr lang="pt-PT"/>
           </a:p>
@@ -1730,7 +1730,7 @@
           <a:p>
             <a:fld id="{A8056B92-FCDB-4810-8779-64E0CAC2F787}" type="datetimeFigureOut">
               <a:rPr lang="pt-PT" smtClean="0"/>
-              <a:t>20/05/2018</a:t>
+              <a:t>23/05/2018</a:t>
             </a:fld>
             <a:endParaRPr lang="pt-PT"/>
           </a:p>
@@ -1825,7 +1825,7 @@
           <a:p>
             <a:fld id="{A8056B92-FCDB-4810-8779-64E0CAC2F787}" type="datetimeFigureOut">
               <a:rPr lang="pt-PT" smtClean="0"/>
-              <a:t>20/05/2018</a:t>
+              <a:t>23/05/2018</a:t>
             </a:fld>
             <a:endParaRPr lang="pt-PT"/>
           </a:p>
@@ -2102,7 +2102,7 @@
           <a:p>
             <a:fld id="{A8056B92-FCDB-4810-8779-64E0CAC2F787}" type="datetimeFigureOut">
               <a:rPr lang="pt-PT" smtClean="0"/>
-              <a:t>20/05/2018</a:t>
+              <a:t>23/05/2018</a:t>
             </a:fld>
             <a:endParaRPr lang="pt-PT"/>
           </a:p>
@@ -2359,7 +2359,7 @@
           <a:p>
             <a:fld id="{A8056B92-FCDB-4810-8779-64E0CAC2F787}" type="datetimeFigureOut">
               <a:rPr lang="pt-PT" smtClean="0"/>
-              <a:t>20/05/2018</a:t>
+              <a:t>23/05/2018</a:t>
             </a:fld>
             <a:endParaRPr lang="pt-PT"/>
           </a:p>
@@ -2572,7 +2572,7 @@
           <a:p>
             <a:fld id="{A8056B92-FCDB-4810-8779-64E0CAC2F787}" type="datetimeFigureOut">
               <a:rPr lang="pt-PT" smtClean="0"/>
-              <a:t>20/05/2018</a:t>
+              <a:t>23/05/2018</a:t>
             </a:fld>
             <a:endParaRPr lang="pt-PT"/>
           </a:p>
@@ -4313,7 +4313,7 @@
           <a:p>
             <a:pPr algn="ctr"/>
             <a:r>
-              <a:rPr lang="pt-PT" b="1" dirty="0">
+              <a:rPr lang="pt-PT" b="1">
                 <a:solidFill>
                   <a:schemeClr val="accent4">
                     <a:lumMod val="60000"/>
@@ -4321,8 +4321,16 @@
                   </a:schemeClr>
                 </a:solidFill>
               </a:rPr>
-              <a:t>Exercícios!</a:t>
-            </a:r>
+              <a:t>Exemplos!</a:t>
+            </a:r>
+            <a:endParaRPr lang="pt-PT" b="1" dirty="0">
+              <a:solidFill>
+                <a:schemeClr val="accent4">
+                  <a:lumMod val="60000"/>
+                  <a:lumOff val="40000"/>
+                </a:schemeClr>
+              </a:solidFill>
+            </a:endParaRPr>
           </a:p>
         </p:txBody>
       </p:sp>

</xml_diff>